<commit_message>
Fix a bug where pptx file wasn't being found on live website.  Possible relative vs absolute path issue.
</commit_message>
<xml_diff>
--- a/ou_app/resources/ppt_output_01.pptx
+++ b/ou_app/resources/ppt_output_01.pptx
@@ -12,6 +12,12 @@
     <p:sldId id="260" r:id="rId10"/>
     <p:sldId id="261" r:id="rId11"/>
     <p:sldId id="262" r:id="rId12"/>
+    <p:sldId id="263" r:id="rId13"/>
+    <p:sldId id="264" r:id="rId14"/>
+    <p:sldId id="265" r:id="rId15"/>
+    <p:sldId id="266" r:id="rId16"/>
+    <p:sldId id="267" r:id="rId17"/>
+    <p:sldId id="268" r:id="rId18"/>
   </p:sldIdLst>
   <p:sldSz cx="12192000" cy="6858000"/>
   <p:notesSz cx="6858000" cy="9144000"/>
@@ -3373,7 +3379,7 @@
           <a:lstStyle/>
           <a:p>
             <a:r>
-              <a:t>Slide Deck Title</a:t>
+              <a:t>Data Node 1</a:t>
             </a:r>
           </a:p>
         </p:txBody>
@@ -3394,7 +3400,249 @@
           <a:lstStyle/>
           <a:p>
             <a:r>
-              <a:t>Slide Deck Sub-Title</a:t>
+              <a:t>Slide Deck</a:t>
+            </a:r>
+          </a:p>
+        </p:txBody>
+      </p:sp>
+    </p:spTree>
+  </p:cSld>
+  <p:clrMapOvr>
+    <a:masterClrMapping/>
+  </p:clrMapOvr>
+</p:sld>
+</file>
+
+<file path=ppt/slides/slide10.xml><?xml version="1.0" encoding="utf-8"?>
+<p:sld xmlns:a="http://schemas.openxmlformats.org/drawingml/2006/main" xmlns:p="http://schemas.openxmlformats.org/presentationml/2006/main" xmlns:r="http://schemas.openxmlformats.org/officeDocument/2006/relationships">
+  <p:cSld>
+    <p:spTree>
+      <p:nvGrpSpPr>
+        <p:cNvPr id="1" name=""/>
+        <p:cNvGrpSpPr/>
+        <p:nvPr/>
+      </p:nvGrpSpPr>
+      <p:grpSpPr/>
+      <p:sp>
+        <p:nvSpPr>
+          <p:cNvPr id="2" name="Title 1"/>
+          <p:cNvSpPr>
+            <a:spLocks noGrp="1"/>
+          </p:cNvSpPr>
+          <p:nvPr>
+            <p:ph type="title"/>
+          </p:nvPr>
+        </p:nvSpPr>
+        <p:spPr/>
+        <p:txBody>
+          <a:bodyPr/>
+          <a:lstStyle/>
+          <a:p/>
+        </p:txBody>
+      </p:sp>
+      <p:sp>
+        <p:nvSpPr>
+          <p:cNvPr id="3" name="Text Placeholder 2"/>
+          <p:cNvSpPr>
+            <a:spLocks noGrp="1"/>
+          </p:cNvSpPr>
+          <p:nvPr>
+            <p:ph type="body" idx="1"/>
+          </p:nvPr>
+        </p:nvSpPr>
+        <p:spPr/>
+        <p:txBody>
+          <a:bodyPr/>
+          <a:lstStyle/>
+          <a:p>
+            <a:r>
+              <a:t>Section 3</a:t>
+            </a:r>
+          </a:p>
+        </p:txBody>
+      </p:sp>
+    </p:spTree>
+  </p:cSld>
+  <p:clrMapOvr>
+    <a:masterClrMapping/>
+  </p:clrMapOvr>
+</p:sld>
+</file>
+
+<file path=ppt/slides/slide11.xml><?xml version="1.0" encoding="utf-8"?>
+<p:sld xmlns:a="http://schemas.openxmlformats.org/drawingml/2006/main" xmlns:p="http://schemas.openxmlformats.org/presentationml/2006/main" xmlns:r="http://schemas.openxmlformats.org/officeDocument/2006/relationships">
+  <p:cSld>
+    <p:spTree>
+      <p:nvGrpSpPr>
+        <p:cNvPr id="1" name=""/>
+        <p:cNvGrpSpPr/>
+        <p:nvPr/>
+      </p:nvGrpSpPr>
+      <p:grpSpPr/>
+      <p:sp>
+        <p:nvSpPr>
+          <p:cNvPr id="2" name="Title 1"/>
+          <p:cNvSpPr>
+            <a:spLocks noGrp="1"/>
+          </p:cNvSpPr>
+          <p:nvPr>
+            <p:ph type="title"/>
+          </p:nvPr>
+        </p:nvSpPr>
+        <p:spPr/>
+        <p:txBody>
+          <a:bodyPr/>
+          <a:lstStyle/>
+          <a:p/>
+        </p:txBody>
+      </p:sp>
+      <p:sp>
+        <p:nvSpPr>
+          <p:cNvPr id="3" name="Text Placeholder 2"/>
+          <p:cNvSpPr>
+            <a:spLocks noGrp="1"/>
+          </p:cNvSpPr>
+          <p:nvPr>
+            <p:ph type="body" idx="1"/>
+          </p:nvPr>
+        </p:nvSpPr>
+        <p:spPr/>
+        <p:txBody>
+          <a:bodyPr/>
+          <a:lstStyle/>
+          <a:p>
+            <a:r>
+              <a:t>Section 4</a:t>
+            </a:r>
+          </a:p>
+        </p:txBody>
+      </p:sp>
+    </p:spTree>
+  </p:cSld>
+  <p:clrMapOvr>
+    <a:masterClrMapping/>
+  </p:clrMapOvr>
+</p:sld>
+</file>
+
+<file path=ppt/slides/slide12.xml><?xml version="1.0" encoding="utf-8"?>
+<p:sld xmlns:a="http://schemas.openxmlformats.org/drawingml/2006/main" xmlns:p="http://schemas.openxmlformats.org/presentationml/2006/main" xmlns:r="http://schemas.openxmlformats.org/officeDocument/2006/relationships">
+  <p:cSld>
+    <p:spTree>
+      <p:nvGrpSpPr>
+        <p:cNvPr id="1" name=""/>
+        <p:cNvGrpSpPr/>
+        <p:nvPr/>
+      </p:nvGrpSpPr>
+      <p:grpSpPr/>
+      <p:sp>
+        <p:nvSpPr>
+          <p:cNvPr id="2" name="Title 1"/>
+          <p:cNvSpPr>
+            <a:spLocks noGrp="1"/>
+          </p:cNvSpPr>
+          <p:nvPr>
+            <p:ph type="title"/>
+          </p:nvPr>
+        </p:nvSpPr>
+        <p:spPr/>
+        <p:txBody>
+          <a:bodyPr/>
+          <a:lstStyle/>
+          <a:p>
+            <a:r>
+              <a:t>Slide 7</a:t>
+            </a:r>
+          </a:p>
+        </p:txBody>
+      </p:sp>
+      <p:sp>
+        <p:nvSpPr>
+          <p:cNvPr id="3" name="Content Placeholder 2"/>
+          <p:cNvSpPr>
+            <a:spLocks noGrp="1"/>
+          </p:cNvSpPr>
+          <p:nvPr>
+            <p:ph idx="1"/>
+          </p:nvPr>
+        </p:nvSpPr>
+        <p:spPr/>
+        <p:txBody>
+          <a:bodyPr/>
+          <a:lstStyle/>
+          <a:p/>
+        </p:txBody>
+      </p:sp>
+    </p:spTree>
+  </p:cSld>
+  <p:clrMapOvr>
+    <a:masterClrMapping/>
+  </p:clrMapOvr>
+</p:sld>
+</file>
+
+<file path=ppt/slides/slide13.xml><?xml version="1.0" encoding="utf-8"?>
+<p:sld xmlns:a="http://schemas.openxmlformats.org/drawingml/2006/main" xmlns:p="http://schemas.openxmlformats.org/presentationml/2006/main" xmlns:r="http://schemas.openxmlformats.org/officeDocument/2006/relationships">
+  <p:cSld>
+    <p:spTree>
+      <p:nvGrpSpPr>
+        <p:cNvPr id="1" name=""/>
+        <p:cNvGrpSpPr/>
+        <p:nvPr/>
+      </p:nvGrpSpPr>
+      <p:grpSpPr/>
+      <p:sp>
+        <p:nvSpPr>
+          <p:cNvPr id="2" name="Title 1"/>
+          <p:cNvSpPr>
+            <a:spLocks noGrp="1"/>
+          </p:cNvSpPr>
+          <p:nvPr>
+            <p:ph type="title"/>
+          </p:nvPr>
+        </p:nvSpPr>
+        <p:spPr/>
+        <p:txBody>
+          <a:bodyPr/>
+          <a:lstStyle/>
+          <a:p>
+            <a:r>
+              <a:t>Slide 8</a:t>
+            </a:r>
+          </a:p>
+        </p:txBody>
+      </p:sp>
+      <p:sp>
+        <p:nvSpPr>
+          <p:cNvPr id="3" name="Content Placeholder 2"/>
+          <p:cNvSpPr>
+            <a:spLocks noGrp="1"/>
+          </p:cNvSpPr>
+          <p:nvPr>
+            <p:ph idx="1"/>
+          </p:nvPr>
+        </p:nvSpPr>
+        <p:spPr/>
+        <p:txBody>
+          <a:bodyPr/>
+          <a:lstStyle/>
+          <a:p/>
+          <a:p>
+            <a:pPr/>
+            <a:r>
+              <a:t>Bullet O</a:t>
+            </a:r>
+          </a:p>
+          <a:p>
+            <a:pPr/>
+            <a:r>
+              <a:t>Bullet P</a:t>
+            </a:r>
+          </a:p>
+          <a:p>
+            <a:pPr/>
+            <a:r>
+              <a:t>Bullet Q</a:t>
             </a:r>
           </a:p>
         </p:txBody>
@@ -3431,11 +3679,7 @@
         <p:txBody>
           <a:bodyPr/>
           <a:lstStyle/>
-          <a:p>
-            <a:r>
-              <a:t>PowerPoint Generation - Update</a:t>
-            </a:r>
-          </a:p>
+          <a:p/>
         </p:txBody>
       </p:sp>
       <p:sp>
@@ -3454,7 +3698,7 @@
           <a:lstStyle/>
           <a:p>
             <a:r>
-              <a:t>This is sub-section text 1</a:t>
+              <a:t>Section 1</a:t>
             </a:r>
           </a:p>
         </p:txBody>
@@ -3493,7 +3737,7 @@
           <a:lstStyle/>
           <a:p>
             <a:r>
-              <a:t>What is currently supported?</a:t>
+              <a:t>Slide 1</a:t>
             </a:r>
           </a:p>
         </p:txBody>
@@ -3513,6 +3757,24 @@
           <a:bodyPr/>
           <a:lstStyle/>
           <a:p/>
+          <a:p>
+            <a:pPr/>
+            <a:r>
+              <a:t>Bullet A</a:t>
+            </a:r>
+          </a:p>
+          <a:p>
+            <a:pPr/>
+            <a:r>
+              <a:t>Bullet B</a:t>
+            </a:r>
+          </a:p>
+          <a:p>
+            <a:pPr/>
+            <a:r>
+              <a:t>Bullet C</a:t>
+            </a:r>
+          </a:p>
         </p:txBody>
       </p:sp>
     </p:spTree>
@@ -3549,7 +3811,7 @@
           <a:lstStyle/>
           <a:p>
             <a:r>
-              <a:t>What is coming next?</a:t>
+              <a:t>Slide 2</a:t>
             </a:r>
           </a:p>
         </p:txBody>
@@ -3572,13 +3834,25 @@
           <a:p>
             <a:pPr/>
             <a:r>
-              <a:t>Now supports the creation of .pptx file after transforming the data</a:t>
+              <a:t>Bullet D</a:t>
             </a:r>
           </a:p>
           <a:p>
             <a:pPr/>
             <a:r>
-              <a:t>Quite basic functionality - only supports hard-coded filename for output</a:t>
+              <a:t>Bullet E</a:t>
+            </a:r>
+          </a:p>
+          <a:p>
+            <a:pPr/>
+            <a:r>
+              <a:t>Bullet F</a:t>
+            </a:r>
+          </a:p>
+          <a:p>
+            <a:pPr/>
+            <a:r>
+              <a:t>Bullet G</a:t>
             </a:r>
           </a:p>
         </p:txBody>
@@ -3617,30 +3891,26 @@
           <a:lstStyle/>
           <a:p>
             <a:r>
-              <a:t>Other Upcoming Priorities</a:t>
-            </a:r>
-          </a:p>
-        </p:txBody>
-      </p:sp>
-      <p:sp>
-        <p:nvSpPr>
-          <p:cNvPr id="3" name="Text Placeholder 2"/>
-          <p:cNvSpPr>
-            <a:spLocks noGrp="1"/>
-          </p:cNvSpPr>
-          <p:nvPr>
-            <p:ph type="body" idx="1"/>
-          </p:nvPr>
-        </p:nvSpPr>
-        <p:spPr/>
-        <p:txBody>
-          <a:bodyPr/>
-          <a:lstStyle/>
-          <a:p>
-            <a:r>
-              <a:t>This is sub-section text 2</a:t>
-            </a:r>
-          </a:p>
+              <a:t>Slide 3</a:t>
+            </a:r>
+          </a:p>
+        </p:txBody>
+      </p:sp>
+      <p:sp>
+        <p:nvSpPr>
+          <p:cNvPr id="3" name="Content Placeholder 2"/>
+          <p:cNvSpPr>
+            <a:spLocks noGrp="1"/>
+          </p:cNvSpPr>
+          <p:nvPr>
+            <p:ph idx="1"/>
+          </p:nvPr>
+        </p:nvSpPr>
+        <p:spPr/>
+        <p:txBody>
+          <a:bodyPr/>
+          <a:lstStyle/>
+          <a:p/>
         </p:txBody>
       </p:sp>
     </p:spTree>
@@ -3675,62 +3945,26 @@
         <p:txBody>
           <a:bodyPr/>
           <a:lstStyle/>
-          <a:p>
-            <a:r>
-              <a:t>Meta-data within outline to drive generation</a:t>
-            </a:r>
-          </a:p>
-        </p:txBody>
-      </p:sp>
-      <p:sp>
-        <p:nvSpPr>
-          <p:cNvPr id="3" name="Content Placeholder 2"/>
-          <p:cNvSpPr>
-            <a:spLocks noGrp="1"/>
-          </p:cNvSpPr>
-          <p:nvPr>
-            <p:ph idx="1"/>
-          </p:nvPr>
-        </p:nvSpPr>
-        <p:spPr/>
-        <p:txBody>
-          <a:bodyPr/>
-          <a:lstStyle/>
           <a:p/>
-          <a:p>
-            <a:pPr/>
-            <a:r>
-              <a:t>Don’t choose from hard-coded dropdown</a:t>
-            </a:r>
-          </a:p>
-          <a:p>
-            <a:pPr lvl="1"/>
-            <a:r>
-              <a:t>Allow uploaded descriptors</a:t>
-            </a:r>
-          </a:p>
-          <a:p>
-            <a:pPr lvl="1"/>
-            <a:r>
-              <a:t>Maybe using JSON</a:t>
-            </a:r>
-          </a:p>
-          <a:p>
-            <a:pPr lvl="2"/>
-            <a:r>
-              <a:t>Another bullet at level 2</a:t>
-            </a:r>
-          </a:p>
-          <a:p>
-            <a:pPr/>
-            <a:r>
-              <a:t>Use embedded data within outline to identify the root node</a:t>
-            </a:r>
-          </a:p>
-          <a:p>
-            <a:pPr/>
-            <a:r>
-              <a:t>Also for what type of transformation</a:t>
+        </p:txBody>
+      </p:sp>
+      <p:sp>
+        <p:nvSpPr>
+          <p:cNvPr id="3" name="Text Placeholder 2"/>
+          <p:cNvSpPr>
+            <a:spLocks noGrp="1"/>
+          </p:cNvSpPr>
+          <p:nvPr>
+            <p:ph type="body" idx="1"/>
+          </p:nvPr>
+        </p:nvSpPr>
+        <p:spPr/>
+        <p:txBody>
+          <a:bodyPr/>
+          <a:lstStyle/>
+          <a:p>
+            <a:r>
+              <a:t>Section 2</a:t>
             </a:r>
           </a:p>
         </p:txBody>
@@ -3769,7 +4003,7 @@
           <a:lstStyle/>
           <a:p>
             <a:r>
-              <a:t>CSV files</a:t>
+              <a:t>Slide 4</a:t>
             </a:r>
           </a:p>
         </p:txBody>
@@ -3792,33 +4026,157 @@
           <a:p>
             <a:pPr/>
             <a:r>
-              <a:t>Tabular data downloadable as a CSV file</a:t>
-            </a:r>
-          </a:p>
-          <a:p>
-            <a:pPr lvl="1"/>
-            <a:r>
-              <a:t>Bullet level 1</a:t>
-            </a:r>
-          </a:p>
-          <a:p>
-            <a:pPr lvl="2"/>
-            <a:r>
-              <a:t>Bullet Level 2a</a:t>
-            </a:r>
-          </a:p>
-          <a:p>
-            <a:pPr lvl="2"/>
-            <a:r>
-              <a:t>Bullet Level 2b</a:t>
+              <a:t>Bullet H</a:t>
             </a:r>
           </a:p>
           <a:p>
             <a:pPr/>
             <a:r>
-              <a:t>Importable into Excel</a:t>
-            </a:r>
-          </a:p>
+              <a:t>Bullet I</a:t>
+            </a:r>
+          </a:p>
+          <a:p>
+            <a:pPr/>
+            <a:r>
+              <a:t>Bullet J</a:t>
+            </a:r>
+          </a:p>
+        </p:txBody>
+      </p:sp>
+    </p:spTree>
+  </p:cSld>
+  <p:clrMapOvr>
+    <a:masterClrMapping/>
+  </p:clrMapOvr>
+</p:sld>
+</file>
+
+<file path=ppt/slides/slide8.xml><?xml version="1.0" encoding="utf-8"?>
+<p:sld xmlns:a="http://schemas.openxmlformats.org/drawingml/2006/main" xmlns:p="http://schemas.openxmlformats.org/presentationml/2006/main" xmlns:r="http://schemas.openxmlformats.org/officeDocument/2006/relationships">
+  <p:cSld>
+    <p:spTree>
+      <p:nvGrpSpPr>
+        <p:cNvPr id="1" name=""/>
+        <p:cNvGrpSpPr/>
+        <p:nvPr/>
+      </p:nvGrpSpPr>
+      <p:grpSpPr/>
+      <p:sp>
+        <p:nvSpPr>
+          <p:cNvPr id="2" name="Title 1"/>
+          <p:cNvSpPr>
+            <a:spLocks noGrp="1"/>
+          </p:cNvSpPr>
+          <p:nvPr>
+            <p:ph type="title"/>
+          </p:nvPr>
+        </p:nvSpPr>
+        <p:spPr/>
+        <p:txBody>
+          <a:bodyPr/>
+          <a:lstStyle/>
+          <a:p>
+            <a:r>
+              <a:t>Slide 5</a:t>
+            </a:r>
+          </a:p>
+        </p:txBody>
+      </p:sp>
+      <p:sp>
+        <p:nvSpPr>
+          <p:cNvPr id="3" name="Content Placeholder 2"/>
+          <p:cNvSpPr>
+            <a:spLocks noGrp="1"/>
+          </p:cNvSpPr>
+          <p:nvPr>
+            <p:ph idx="1"/>
+          </p:nvPr>
+        </p:nvSpPr>
+        <p:spPr/>
+        <p:txBody>
+          <a:bodyPr/>
+          <a:lstStyle/>
+          <a:p/>
+          <a:p>
+            <a:pPr/>
+            <a:r>
+              <a:t>Bullet K</a:t>
+            </a:r>
+          </a:p>
+          <a:p>
+            <a:pPr/>
+            <a:r>
+              <a:t>Bullet L</a:t>
+            </a:r>
+          </a:p>
+          <a:p>
+            <a:pPr/>
+            <a:r>
+              <a:t>Bullet M</a:t>
+            </a:r>
+          </a:p>
+          <a:p>
+            <a:pPr/>
+            <a:r>
+              <a:t>Bullet N</a:t>
+            </a:r>
+          </a:p>
+        </p:txBody>
+      </p:sp>
+    </p:spTree>
+  </p:cSld>
+  <p:clrMapOvr>
+    <a:masterClrMapping/>
+  </p:clrMapOvr>
+</p:sld>
+</file>
+
+<file path=ppt/slides/slide9.xml><?xml version="1.0" encoding="utf-8"?>
+<p:sld xmlns:a="http://schemas.openxmlformats.org/drawingml/2006/main" xmlns:p="http://schemas.openxmlformats.org/presentationml/2006/main" xmlns:r="http://schemas.openxmlformats.org/officeDocument/2006/relationships">
+  <p:cSld>
+    <p:spTree>
+      <p:nvGrpSpPr>
+        <p:cNvPr id="1" name=""/>
+        <p:cNvGrpSpPr/>
+        <p:nvPr/>
+      </p:nvGrpSpPr>
+      <p:grpSpPr/>
+      <p:sp>
+        <p:nvSpPr>
+          <p:cNvPr id="2" name="Title 1"/>
+          <p:cNvSpPr>
+            <a:spLocks noGrp="1"/>
+          </p:cNvSpPr>
+          <p:nvPr>
+            <p:ph type="title"/>
+          </p:nvPr>
+        </p:nvSpPr>
+        <p:spPr/>
+        <p:txBody>
+          <a:bodyPr/>
+          <a:lstStyle/>
+          <a:p>
+            <a:r>
+              <a:t>Slide 6</a:t>
+            </a:r>
+          </a:p>
+        </p:txBody>
+      </p:sp>
+      <p:sp>
+        <p:nvSpPr>
+          <p:cNvPr id="3" name="Content Placeholder 2"/>
+          <p:cNvSpPr>
+            <a:spLocks noGrp="1"/>
+          </p:cNvSpPr>
+          <p:nvPr>
+            <p:ph idx="1"/>
+          </p:nvPr>
+        </p:nvSpPr>
+        <p:spPr/>
+        <p:txBody>
+          <a:bodyPr/>
+          <a:lstStyle/>
+          <a:p/>
         </p:txBody>
       </p:sp>
     </p:spTree>

</xml_diff>

<commit_message>
Cleaning up a bit before next round of development.  Removing database from git and ignoring.
</commit_message>
<xml_diff>
--- a/ou_app/resources/ppt_output_01.pptx
+++ b/ou_app/resources/ppt_output_01.pptx
@@ -11,13 +11,6 @@
     <p:sldId id="259" r:id="rId9"/>
     <p:sldId id="260" r:id="rId10"/>
     <p:sldId id="261" r:id="rId11"/>
-    <p:sldId id="262" r:id="rId12"/>
-    <p:sldId id="263" r:id="rId13"/>
-    <p:sldId id="264" r:id="rId14"/>
-    <p:sldId id="265" r:id="rId15"/>
-    <p:sldId id="266" r:id="rId16"/>
-    <p:sldId id="267" r:id="rId17"/>
-    <p:sldId id="268" r:id="rId18"/>
   </p:sldIdLst>
   <p:sldSz cx="12192000" cy="6858000"/>
   <p:notesSz cx="6858000" cy="9144000"/>
@@ -3379,7 +3372,7 @@
           <a:lstStyle/>
           <a:p>
             <a:r>
-              <a:t>Data Node 1</a:t>
+              <a:t>Slide Deck Title (before the colon)</a:t>
             </a:r>
           </a:p>
         </p:txBody>
@@ -3400,249 +3393,7 @@
           <a:lstStyle/>
           <a:p>
             <a:r>
-              <a:t>Slide Deck</a:t>
-            </a:r>
-          </a:p>
-        </p:txBody>
-      </p:sp>
-    </p:spTree>
-  </p:cSld>
-  <p:clrMapOvr>
-    <a:masterClrMapping/>
-  </p:clrMapOvr>
-</p:sld>
-</file>
-
-<file path=ppt/slides/slide10.xml><?xml version="1.0" encoding="utf-8"?>
-<p:sld xmlns:a="http://schemas.openxmlformats.org/drawingml/2006/main" xmlns:p="http://schemas.openxmlformats.org/presentationml/2006/main" xmlns:r="http://schemas.openxmlformats.org/officeDocument/2006/relationships">
-  <p:cSld>
-    <p:spTree>
-      <p:nvGrpSpPr>
-        <p:cNvPr id="1" name=""/>
-        <p:cNvGrpSpPr/>
-        <p:nvPr/>
-      </p:nvGrpSpPr>
-      <p:grpSpPr/>
-      <p:sp>
-        <p:nvSpPr>
-          <p:cNvPr id="2" name="Title 1"/>
-          <p:cNvSpPr>
-            <a:spLocks noGrp="1"/>
-          </p:cNvSpPr>
-          <p:nvPr>
-            <p:ph type="title"/>
-          </p:nvPr>
-        </p:nvSpPr>
-        <p:spPr/>
-        <p:txBody>
-          <a:bodyPr/>
-          <a:lstStyle/>
-          <a:p/>
-        </p:txBody>
-      </p:sp>
-      <p:sp>
-        <p:nvSpPr>
-          <p:cNvPr id="3" name="Text Placeholder 2"/>
-          <p:cNvSpPr>
-            <a:spLocks noGrp="1"/>
-          </p:cNvSpPr>
-          <p:nvPr>
-            <p:ph type="body" idx="1"/>
-          </p:nvPr>
-        </p:nvSpPr>
-        <p:spPr/>
-        <p:txBody>
-          <a:bodyPr/>
-          <a:lstStyle/>
-          <a:p>
-            <a:r>
-              <a:t>Section 3</a:t>
-            </a:r>
-          </a:p>
-        </p:txBody>
-      </p:sp>
-    </p:spTree>
-  </p:cSld>
-  <p:clrMapOvr>
-    <a:masterClrMapping/>
-  </p:clrMapOvr>
-</p:sld>
-</file>
-
-<file path=ppt/slides/slide11.xml><?xml version="1.0" encoding="utf-8"?>
-<p:sld xmlns:a="http://schemas.openxmlformats.org/drawingml/2006/main" xmlns:p="http://schemas.openxmlformats.org/presentationml/2006/main" xmlns:r="http://schemas.openxmlformats.org/officeDocument/2006/relationships">
-  <p:cSld>
-    <p:spTree>
-      <p:nvGrpSpPr>
-        <p:cNvPr id="1" name=""/>
-        <p:cNvGrpSpPr/>
-        <p:nvPr/>
-      </p:nvGrpSpPr>
-      <p:grpSpPr/>
-      <p:sp>
-        <p:nvSpPr>
-          <p:cNvPr id="2" name="Title 1"/>
-          <p:cNvSpPr>
-            <a:spLocks noGrp="1"/>
-          </p:cNvSpPr>
-          <p:nvPr>
-            <p:ph type="title"/>
-          </p:nvPr>
-        </p:nvSpPr>
-        <p:spPr/>
-        <p:txBody>
-          <a:bodyPr/>
-          <a:lstStyle/>
-          <a:p/>
-        </p:txBody>
-      </p:sp>
-      <p:sp>
-        <p:nvSpPr>
-          <p:cNvPr id="3" name="Text Placeholder 2"/>
-          <p:cNvSpPr>
-            <a:spLocks noGrp="1"/>
-          </p:cNvSpPr>
-          <p:nvPr>
-            <p:ph type="body" idx="1"/>
-          </p:nvPr>
-        </p:nvSpPr>
-        <p:spPr/>
-        <p:txBody>
-          <a:bodyPr/>
-          <a:lstStyle/>
-          <a:p>
-            <a:r>
-              <a:t>Section 4</a:t>
-            </a:r>
-          </a:p>
-        </p:txBody>
-      </p:sp>
-    </p:spTree>
-  </p:cSld>
-  <p:clrMapOvr>
-    <a:masterClrMapping/>
-  </p:clrMapOvr>
-</p:sld>
-</file>
-
-<file path=ppt/slides/slide12.xml><?xml version="1.0" encoding="utf-8"?>
-<p:sld xmlns:a="http://schemas.openxmlformats.org/drawingml/2006/main" xmlns:p="http://schemas.openxmlformats.org/presentationml/2006/main" xmlns:r="http://schemas.openxmlformats.org/officeDocument/2006/relationships">
-  <p:cSld>
-    <p:spTree>
-      <p:nvGrpSpPr>
-        <p:cNvPr id="1" name=""/>
-        <p:cNvGrpSpPr/>
-        <p:nvPr/>
-      </p:nvGrpSpPr>
-      <p:grpSpPr/>
-      <p:sp>
-        <p:nvSpPr>
-          <p:cNvPr id="2" name="Title 1"/>
-          <p:cNvSpPr>
-            <a:spLocks noGrp="1"/>
-          </p:cNvSpPr>
-          <p:nvPr>
-            <p:ph type="title"/>
-          </p:nvPr>
-        </p:nvSpPr>
-        <p:spPr/>
-        <p:txBody>
-          <a:bodyPr/>
-          <a:lstStyle/>
-          <a:p>
-            <a:r>
-              <a:t>Slide 7</a:t>
-            </a:r>
-          </a:p>
-        </p:txBody>
-      </p:sp>
-      <p:sp>
-        <p:nvSpPr>
-          <p:cNvPr id="3" name="Content Placeholder 2"/>
-          <p:cNvSpPr>
-            <a:spLocks noGrp="1"/>
-          </p:cNvSpPr>
-          <p:nvPr>
-            <p:ph idx="1"/>
-          </p:nvPr>
-        </p:nvSpPr>
-        <p:spPr/>
-        <p:txBody>
-          <a:bodyPr/>
-          <a:lstStyle/>
-          <a:p/>
-        </p:txBody>
-      </p:sp>
-    </p:spTree>
-  </p:cSld>
-  <p:clrMapOvr>
-    <a:masterClrMapping/>
-  </p:clrMapOvr>
-</p:sld>
-</file>
-
-<file path=ppt/slides/slide13.xml><?xml version="1.0" encoding="utf-8"?>
-<p:sld xmlns:a="http://schemas.openxmlformats.org/drawingml/2006/main" xmlns:p="http://schemas.openxmlformats.org/presentationml/2006/main" xmlns:r="http://schemas.openxmlformats.org/officeDocument/2006/relationships">
-  <p:cSld>
-    <p:spTree>
-      <p:nvGrpSpPr>
-        <p:cNvPr id="1" name=""/>
-        <p:cNvGrpSpPr/>
-        <p:nvPr/>
-      </p:nvGrpSpPr>
-      <p:grpSpPr/>
-      <p:sp>
-        <p:nvSpPr>
-          <p:cNvPr id="2" name="Title 1"/>
-          <p:cNvSpPr>
-            <a:spLocks noGrp="1"/>
-          </p:cNvSpPr>
-          <p:nvPr>
-            <p:ph type="title"/>
-          </p:nvPr>
-        </p:nvSpPr>
-        <p:spPr/>
-        <p:txBody>
-          <a:bodyPr/>
-          <a:lstStyle/>
-          <a:p>
-            <a:r>
-              <a:t>Slide 8</a:t>
-            </a:r>
-          </a:p>
-        </p:txBody>
-      </p:sp>
-      <p:sp>
-        <p:nvSpPr>
-          <p:cNvPr id="3" name="Content Placeholder 2"/>
-          <p:cNvSpPr>
-            <a:spLocks noGrp="1"/>
-          </p:cNvSpPr>
-          <p:nvPr>
-            <p:ph idx="1"/>
-          </p:nvPr>
-        </p:nvSpPr>
-        <p:spPr/>
-        <p:txBody>
-          <a:bodyPr/>
-          <a:lstStyle/>
-          <a:p/>
-          <a:p>
-            <a:pPr/>
-            <a:r>
-              <a:t>Bullet O</a:t>
-            </a:r>
-          </a:p>
-          <a:p>
-            <a:pPr/>
-            <a:r>
-              <a:t>Bullet P</a:t>
-            </a:r>
-          </a:p>
-          <a:p>
-            <a:pPr/>
-            <a:r>
-              <a:t>Bullet Q</a:t>
+              <a:t>Slide Deck Sub-Title (after the colon)</a:t>
             </a:r>
           </a:p>
         </p:txBody>
@@ -3679,7 +3430,11 @@
         <p:txBody>
           <a:bodyPr/>
           <a:lstStyle/>
-          <a:p/>
+          <a:p>
+            <a:r>
+              <a:t>Slide Deck Section 1 Title (before colon)</a:t>
+            </a:r>
+          </a:p>
         </p:txBody>
       </p:sp>
       <p:sp>
@@ -3698,7 +3453,7 @@
           <a:lstStyle/>
           <a:p>
             <a:r>
-              <a:t>Section 1</a:t>
+              <a:t>Slide Deck Section 1 Sub-Title. You can have quite a lot of text in this field but you can’t use returns at the moment.</a:t>
             </a:r>
           </a:p>
         </p:txBody>
@@ -3737,7 +3492,7 @@
           <a:lstStyle/>
           <a:p>
             <a:r>
-              <a:t>Slide 1</a:t>
+              <a:t>Section 1 Slide 1 Title</a:t>
             </a:r>
           </a:p>
         </p:txBody>
@@ -3760,19 +3515,13 @@
           <a:p>
             <a:pPr/>
             <a:r>
-              <a:t>Bullet A</a:t>
+              <a:t>Section 1 Slide 1 Bullet 1</a:t>
             </a:r>
           </a:p>
           <a:p>
             <a:pPr/>
             <a:r>
-              <a:t>Bullet B</a:t>
-            </a:r>
-          </a:p>
-          <a:p>
-            <a:pPr/>
-            <a:r>
-              <a:t>Bullet C</a:t>
+              <a:t>Section 1 Slide 1 Bullet 2</a:t>
             </a:r>
           </a:p>
         </p:txBody>
@@ -3811,7 +3560,7 @@
           <a:lstStyle/>
           <a:p>
             <a:r>
-              <a:t>Slide 2</a:t>
+              <a:t>Section 1 Slide 2 Title</a:t>
             </a:r>
           </a:p>
         </p:txBody>
@@ -3834,25 +3583,13 @@
           <a:p>
             <a:pPr/>
             <a:r>
-              <a:t>Bullet D</a:t>
+              <a:t>Section 1 Slide 2 Bullet 1</a:t>
             </a:r>
           </a:p>
           <a:p>
             <a:pPr/>
             <a:r>
-              <a:t>Bullet E</a:t>
-            </a:r>
-          </a:p>
-          <a:p>
-            <a:pPr/>
-            <a:r>
-              <a:t>Bullet F</a:t>
-            </a:r>
-          </a:p>
-          <a:p>
-            <a:pPr/>
-            <a:r>
-              <a:t>Bullet G</a:t>
+              <a:t>Section 1 Slide 2 Bullet 2</a:t>
             </a:r>
           </a:p>
         </p:txBody>
@@ -3891,26 +3628,30 @@
           <a:lstStyle/>
           <a:p>
             <a:r>
-              <a:t>Slide 3</a:t>
-            </a:r>
-          </a:p>
-        </p:txBody>
-      </p:sp>
-      <p:sp>
-        <p:nvSpPr>
-          <p:cNvPr id="3" name="Content Placeholder 2"/>
-          <p:cNvSpPr>
-            <a:spLocks noGrp="1"/>
-          </p:cNvSpPr>
-          <p:nvPr>
-            <p:ph idx="1"/>
-          </p:nvPr>
-        </p:nvSpPr>
-        <p:spPr/>
-        <p:txBody>
-          <a:bodyPr/>
-          <a:lstStyle/>
-          <a:p/>
+              <a:t>Some More General Notes</a:t>
+            </a:r>
+          </a:p>
+        </p:txBody>
+      </p:sp>
+      <p:sp>
+        <p:nvSpPr>
+          <p:cNvPr id="3" name="Text Placeholder 2"/>
+          <p:cNvSpPr>
+            <a:spLocks noGrp="1"/>
+          </p:cNvSpPr>
+          <p:nvPr>
+            <p:ph type="body" idx="1"/>
+          </p:nvPr>
+        </p:nvSpPr>
+        <p:spPr/>
+        <p:txBody>
+          <a:bodyPr/>
+          <a:lstStyle/>
+          <a:p>
+            <a:r>
+              <a:t>On current functionality.</a:t>
+            </a:r>
+          </a:p>
         </p:txBody>
       </p:sp>
     </p:spTree>
@@ -3945,238 +3686,34 @@
         <p:txBody>
           <a:bodyPr/>
           <a:lstStyle/>
+          <a:p>
+            <a:r>
+              <a:t>Slide Deck</a:t>
+            </a:r>
+          </a:p>
+        </p:txBody>
+      </p:sp>
+      <p:sp>
+        <p:nvSpPr>
+          <p:cNvPr id="3" name="Content Placeholder 2"/>
+          <p:cNvSpPr>
+            <a:spLocks noGrp="1"/>
+          </p:cNvSpPr>
+          <p:nvPr>
+            <p:ph idx="1"/>
+          </p:nvPr>
+        </p:nvSpPr>
+        <p:spPr/>
+        <p:txBody>
+          <a:bodyPr/>
+          <a:lstStyle/>
           <a:p/>
-        </p:txBody>
-      </p:sp>
-      <p:sp>
-        <p:nvSpPr>
-          <p:cNvPr id="3" name="Text Placeholder 2"/>
-          <p:cNvSpPr>
-            <a:spLocks noGrp="1"/>
-          </p:cNvSpPr>
-          <p:nvPr>
-            <p:ph type="body" idx="1"/>
-          </p:nvPr>
-        </p:nvSpPr>
-        <p:spPr/>
-        <p:txBody>
-          <a:bodyPr/>
-          <a:lstStyle/>
-          <a:p>
-            <a:r>
-              <a:t>Section 2</a:t>
-            </a:r>
-          </a:p>
-        </p:txBody>
-      </p:sp>
-    </p:spTree>
-  </p:cSld>
-  <p:clrMapOvr>
-    <a:masterClrMapping/>
-  </p:clrMapOvr>
-</p:sld>
-</file>
-
-<file path=ppt/slides/slide7.xml><?xml version="1.0" encoding="utf-8"?>
-<p:sld xmlns:a="http://schemas.openxmlformats.org/drawingml/2006/main" xmlns:p="http://schemas.openxmlformats.org/presentationml/2006/main" xmlns:r="http://schemas.openxmlformats.org/officeDocument/2006/relationships">
-  <p:cSld>
-    <p:spTree>
-      <p:nvGrpSpPr>
-        <p:cNvPr id="1" name=""/>
-        <p:cNvGrpSpPr/>
-        <p:nvPr/>
-      </p:nvGrpSpPr>
-      <p:grpSpPr/>
-      <p:sp>
-        <p:nvSpPr>
-          <p:cNvPr id="2" name="Title 1"/>
-          <p:cNvSpPr>
-            <a:spLocks noGrp="1"/>
-          </p:cNvSpPr>
-          <p:nvPr>
-            <p:ph type="title"/>
-          </p:nvPr>
-        </p:nvSpPr>
-        <p:spPr/>
-        <p:txBody>
-          <a:bodyPr/>
-          <a:lstStyle/>
-          <a:p>
-            <a:r>
-              <a:t>Slide 4</a:t>
-            </a:r>
-          </a:p>
-        </p:txBody>
-      </p:sp>
-      <p:sp>
-        <p:nvSpPr>
-          <p:cNvPr id="3" name="Content Placeholder 2"/>
-          <p:cNvSpPr>
-            <a:spLocks noGrp="1"/>
-          </p:cNvSpPr>
-          <p:nvPr>
-            <p:ph idx="1"/>
-          </p:nvPr>
-        </p:nvSpPr>
-        <p:spPr/>
-        <p:txBody>
-          <a:bodyPr/>
-          <a:lstStyle/>
-          <a:p/>
           <a:p>
             <a:pPr/>
             <a:r>
-              <a:t>Bullet H</a:t>
-            </a:r>
-          </a:p>
-          <a:p>
-            <a:pPr/>
-            <a:r>
-              <a:t>Bullet I</a:t>
-            </a:r>
-          </a:p>
-          <a:p>
-            <a:pPr/>
-            <a:r>
-              <a:t>Bullet J</a:t>
-            </a:r>
-          </a:p>
-        </p:txBody>
-      </p:sp>
-    </p:spTree>
-  </p:cSld>
-  <p:clrMapOvr>
-    <a:masterClrMapping/>
-  </p:clrMapOvr>
-</p:sld>
-</file>
-
-<file path=ppt/slides/slide8.xml><?xml version="1.0" encoding="utf-8"?>
-<p:sld xmlns:a="http://schemas.openxmlformats.org/drawingml/2006/main" xmlns:p="http://schemas.openxmlformats.org/presentationml/2006/main" xmlns:r="http://schemas.openxmlformats.org/officeDocument/2006/relationships">
-  <p:cSld>
-    <p:spTree>
-      <p:nvGrpSpPr>
-        <p:cNvPr id="1" name=""/>
-        <p:cNvGrpSpPr/>
-        <p:nvPr/>
-      </p:nvGrpSpPr>
-      <p:grpSpPr/>
-      <p:sp>
-        <p:nvSpPr>
-          <p:cNvPr id="2" name="Title 1"/>
-          <p:cNvSpPr>
-            <a:spLocks noGrp="1"/>
-          </p:cNvSpPr>
-          <p:nvPr>
-            <p:ph type="title"/>
-          </p:nvPr>
-        </p:nvSpPr>
-        <p:spPr/>
-        <p:txBody>
-          <a:bodyPr/>
-          <a:lstStyle/>
-          <a:p>
-            <a:r>
-              <a:t>Slide 5</a:t>
-            </a:r>
-          </a:p>
-        </p:txBody>
-      </p:sp>
-      <p:sp>
-        <p:nvSpPr>
-          <p:cNvPr id="3" name="Content Placeholder 2"/>
-          <p:cNvSpPr>
-            <a:spLocks noGrp="1"/>
-          </p:cNvSpPr>
-          <p:nvPr>
-            <p:ph idx="1"/>
-          </p:nvPr>
-        </p:nvSpPr>
-        <p:spPr/>
-        <p:txBody>
-          <a:bodyPr/>
-          <a:lstStyle/>
-          <a:p/>
-          <a:p>
-            <a:pPr/>
-            <a:r>
-              <a:t>Bullet K</a:t>
-            </a:r>
-          </a:p>
-          <a:p>
-            <a:pPr/>
-            <a:r>
-              <a:t>Bullet L</a:t>
-            </a:r>
-          </a:p>
-          <a:p>
-            <a:pPr/>
-            <a:r>
-              <a:t>Bullet M</a:t>
-            </a:r>
-          </a:p>
-          <a:p>
-            <a:pPr/>
-            <a:r>
-              <a:t>Bullet N</a:t>
-            </a:r>
-          </a:p>
-        </p:txBody>
-      </p:sp>
-    </p:spTree>
-  </p:cSld>
-  <p:clrMapOvr>
-    <a:masterClrMapping/>
-  </p:clrMapOvr>
-</p:sld>
-</file>
-
-<file path=ppt/slides/slide9.xml><?xml version="1.0" encoding="utf-8"?>
-<p:sld xmlns:a="http://schemas.openxmlformats.org/drawingml/2006/main" xmlns:p="http://schemas.openxmlformats.org/presentationml/2006/main" xmlns:r="http://schemas.openxmlformats.org/officeDocument/2006/relationships">
-  <p:cSld>
-    <p:spTree>
-      <p:nvGrpSpPr>
-        <p:cNvPr id="1" name=""/>
-        <p:cNvGrpSpPr/>
-        <p:nvPr/>
-      </p:nvGrpSpPr>
-      <p:grpSpPr/>
-      <p:sp>
-        <p:nvSpPr>
-          <p:cNvPr id="2" name="Title 1"/>
-          <p:cNvSpPr>
-            <a:spLocks noGrp="1"/>
-          </p:cNvSpPr>
-          <p:nvPr>
-            <p:ph type="title"/>
-          </p:nvPr>
-        </p:nvSpPr>
-        <p:spPr/>
-        <p:txBody>
-          <a:bodyPr/>
-          <a:lstStyle/>
-          <a:p>
-            <a:r>
-              <a:t>Slide 6</a:t>
-            </a:r>
-          </a:p>
-        </p:txBody>
-      </p:sp>
-      <p:sp>
-        <p:nvSpPr>
-          <p:cNvPr id="3" name="Content Placeholder 2"/>
-          <p:cNvSpPr>
-            <a:spLocks noGrp="1"/>
-          </p:cNvSpPr>
-          <p:nvPr>
-            <p:ph idx="1"/>
-          </p:nvPr>
-        </p:nvSpPr>
-        <p:spPr/>
-        <p:txBody>
-          <a:bodyPr/>
-          <a:lstStyle/>
-          <a:p/>
+              <a:t>I think I’ve got this working pretty well now.  You can use my “Tags” idea to include a Title and Sub-title for the Slide Deck or any section.</a:t>
+            </a:r>
+          </a:p>
         </p:txBody>
       </p:sp>
     </p:spTree>

</xml_diff>

<commit_message>
#171297070 OU form returns descriptor object, but code looks this up - which is redundant and ine...
</commit_message>
<xml_diff>
--- a/ou_app/resources/ppt_output_01.pptx
+++ b/ou_app/resources/ppt_output_01.pptx
@@ -11,6 +11,16 @@
     <p:sldId id="259" r:id="rId9"/>
     <p:sldId id="260" r:id="rId10"/>
     <p:sldId id="261" r:id="rId11"/>
+    <p:sldId id="262" r:id="rId12"/>
+    <p:sldId id="263" r:id="rId13"/>
+    <p:sldId id="264" r:id="rId14"/>
+    <p:sldId id="265" r:id="rId15"/>
+    <p:sldId id="266" r:id="rId16"/>
+    <p:sldId id="267" r:id="rId17"/>
+    <p:sldId id="268" r:id="rId18"/>
+    <p:sldId id="269" r:id="rId19"/>
+    <p:sldId id="270" r:id="rId20"/>
+    <p:sldId id="271" r:id="rId21"/>
   </p:sldIdLst>
   <p:sldSz cx="12192000" cy="6858000"/>
   <p:notesSz cx="6858000" cy="9144000"/>
@@ -3372,7 +3382,7 @@
           <a:lstStyle/>
           <a:p>
             <a:r>
-              <a:t>Slide Deck Title (before the colon)</a:t>
+              <a:t>Academic Framework</a:t>
             </a:r>
           </a:p>
         </p:txBody>
@@ -3393,9 +3403,401 @@
           <a:lstStyle/>
           <a:p>
             <a:r>
-              <a:t>Slide Deck Sub-Title (after the colon)</a:t>
-            </a:r>
-          </a:p>
+              <a:t>Update Session</a:t>
+            </a:r>
+          </a:p>
+        </p:txBody>
+      </p:sp>
+    </p:spTree>
+  </p:cSld>
+  <p:clrMapOvr>
+    <a:masterClrMapping/>
+  </p:clrMapOvr>
+</p:sld>
+</file>
+
+<file path=ppt/slides/slide10.xml><?xml version="1.0" encoding="utf-8"?>
+<p:sld xmlns:a="http://schemas.openxmlformats.org/drawingml/2006/main" xmlns:p="http://schemas.openxmlformats.org/presentationml/2006/main" xmlns:r="http://schemas.openxmlformats.org/officeDocument/2006/relationships">
+  <p:cSld>
+    <p:spTree>
+      <p:nvGrpSpPr>
+        <p:cNvPr id="1" name=""/>
+        <p:cNvGrpSpPr/>
+        <p:nvPr/>
+      </p:nvGrpSpPr>
+      <p:grpSpPr/>
+      <p:sp>
+        <p:nvSpPr>
+          <p:cNvPr id="2" name="Title 1"/>
+          <p:cNvSpPr>
+            <a:spLocks noGrp="1"/>
+          </p:cNvSpPr>
+          <p:nvPr>
+            <p:ph type="title"/>
+          </p:nvPr>
+        </p:nvSpPr>
+        <p:spPr/>
+        <p:txBody>
+          <a:bodyPr/>
+          <a:lstStyle/>
+          <a:p>
+            <a:r>
+              <a:t>Summary of Feedback</a:t>
+            </a:r>
+          </a:p>
+        </p:txBody>
+      </p:sp>
+      <p:sp>
+        <p:nvSpPr>
+          <p:cNvPr id="3" name="Text Placeholder 2"/>
+          <p:cNvSpPr>
+            <a:spLocks noGrp="1"/>
+          </p:cNvSpPr>
+          <p:nvPr>
+            <p:ph type="body" idx="1"/>
+          </p:nvPr>
+        </p:nvSpPr>
+        <p:spPr/>
+        <p:txBody>
+          <a:bodyPr/>
+          <a:lstStyle/>
+          <a:p/>
+        </p:txBody>
+      </p:sp>
+    </p:spTree>
+  </p:cSld>
+  <p:clrMapOvr>
+    <a:masterClrMapping/>
+  </p:clrMapOvr>
+</p:sld>
+</file>
+
+<file path=ppt/slides/slide11.xml><?xml version="1.0" encoding="utf-8"?>
+<p:sld xmlns:a="http://schemas.openxmlformats.org/drawingml/2006/main" xmlns:p="http://schemas.openxmlformats.org/presentationml/2006/main" xmlns:r="http://schemas.openxmlformats.org/officeDocument/2006/relationships">
+  <p:cSld>
+    <p:spTree>
+      <p:nvGrpSpPr>
+        <p:cNvPr id="1" name=""/>
+        <p:cNvGrpSpPr/>
+        <p:nvPr/>
+      </p:nvGrpSpPr>
+      <p:grpSpPr/>
+      <p:sp>
+        <p:nvSpPr>
+          <p:cNvPr id="2" name="Title 1"/>
+          <p:cNvSpPr>
+            <a:spLocks noGrp="1"/>
+          </p:cNvSpPr>
+          <p:nvPr>
+            <p:ph type="title"/>
+          </p:nvPr>
+        </p:nvSpPr>
+        <p:spPr/>
+        <p:txBody>
+          <a:bodyPr/>
+          <a:lstStyle/>
+          <a:p>
+            <a:r>
+              <a:t>Key Themes</a:t>
+            </a:r>
+          </a:p>
+        </p:txBody>
+      </p:sp>
+      <p:sp>
+        <p:nvSpPr>
+          <p:cNvPr id="3" name="Content Placeholder 2"/>
+          <p:cNvSpPr>
+            <a:spLocks noGrp="1"/>
+          </p:cNvSpPr>
+          <p:nvPr>
+            <p:ph idx="1"/>
+          </p:nvPr>
+        </p:nvSpPr>
+        <p:spPr/>
+        <p:txBody>
+          <a:bodyPr/>
+          <a:lstStyle/>
+          <a:p/>
+        </p:txBody>
+      </p:sp>
+    </p:spTree>
+  </p:cSld>
+  <p:clrMapOvr>
+    <a:masterClrMapping/>
+  </p:clrMapOvr>
+</p:sld>
+</file>
+
+<file path=ppt/slides/slide12.xml><?xml version="1.0" encoding="utf-8"?>
+<p:sld xmlns:a="http://schemas.openxmlformats.org/drawingml/2006/main" xmlns:p="http://schemas.openxmlformats.org/presentationml/2006/main" xmlns:r="http://schemas.openxmlformats.org/officeDocument/2006/relationships">
+  <p:cSld>
+    <p:spTree>
+      <p:nvGrpSpPr>
+        <p:cNvPr id="1" name=""/>
+        <p:cNvGrpSpPr/>
+        <p:nvPr/>
+      </p:nvGrpSpPr>
+      <p:grpSpPr/>
+      <p:sp>
+        <p:nvSpPr>
+          <p:cNvPr id="2" name="Title 1"/>
+          <p:cNvSpPr>
+            <a:spLocks noGrp="1"/>
+          </p:cNvSpPr>
+          <p:nvPr>
+            <p:ph type="title"/>
+          </p:nvPr>
+        </p:nvSpPr>
+        <p:spPr/>
+        <p:txBody>
+          <a:bodyPr/>
+          <a:lstStyle/>
+          <a:p>
+            <a:r>
+              <a:t>Areas for discussion</a:t>
+            </a:r>
+          </a:p>
+        </p:txBody>
+      </p:sp>
+      <p:sp>
+        <p:nvSpPr>
+          <p:cNvPr id="3" name="Content Placeholder 2"/>
+          <p:cNvSpPr>
+            <a:spLocks noGrp="1"/>
+          </p:cNvSpPr>
+          <p:nvPr>
+            <p:ph idx="1"/>
+          </p:nvPr>
+        </p:nvSpPr>
+        <p:spPr/>
+        <p:txBody>
+          <a:bodyPr/>
+          <a:lstStyle/>
+          <a:p/>
+        </p:txBody>
+      </p:sp>
+    </p:spTree>
+  </p:cSld>
+  <p:clrMapOvr>
+    <a:masterClrMapping/>
+  </p:clrMapOvr>
+</p:sld>
+</file>
+
+<file path=ppt/slides/slide13.xml><?xml version="1.0" encoding="utf-8"?>
+<p:sld xmlns:a="http://schemas.openxmlformats.org/drawingml/2006/main" xmlns:p="http://schemas.openxmlformats.org/presentationml/2006/main" xmlns:r="http://schemas.openxmlformats.org/officeDocument/2006/relationships">
+  <p:cSld>
+    <p:spTree>
+      <p:nvGrpSpPr>
+        <p:cNvPr id="1" name=""/>
+        <p:cNvGrpSpPr/>
+        <p:nvPr/>
+      </p:nvGrpSpPr>
+      <p:grpSpPr/>
+      <p:sp>
+        <p:nvSpPr>
+          <p:cNvPr id="2" name="Title 1"/>
+          <p:cNvSpPr>
+            <a:spLocks noGrp="1"/>
+          </p:cNvSpPr>
+          <p:nvPr>
+            <p:ph type="title"/>
+          </p:nvPr>
+        </p:nvSpPr>
+        <p:spPr/>
+        <p:txBody>
+          <a:bodyPr/>
+          <a:lstStyle/>
+          <a:p>
+            <a:r>
+              <a:t>Interactive Session 1 (theme)</a:t>
+            </a:r>
+          </a:p>
+        </p:txBody>
+      </p:sp>
+      <p:sp>
+        <p:nvSpPr>
+          <p:cNvPr id="3" name="Text Placeholder 2"/>
+          <p:cNvSpPr>
+            <a:spLocks noGrp="1"/>
+          </p:cNvSpPr>
+          <p:nvPr>
+            <p:ph type="body" idx="1"/>
+          </p:nvPr>
+        </p:nvSpPr>
+        <p:spPr/>
+        <p:txBody>
+          <a:bodyPr/>
+          <a:lstStyle/>
+          <a:p/>
+        </p:txBody>
+      </p:sp>
+    </p:spTree>
+  </p:cSld>
+  <p:clrMapOvr>
+    <a:masterClrMapping/>
+  </p:clrMapOvr>
+</p:sld>
+</file>
+
+<file path=ppt/slides/slide14.xml><?xml version="1.0" encoding="utf-8"?>
+<p:sld xmlns:a="http://schemas.openxmlformats.org/drawingml/2006/main" xmlns:p="http://schemas.openxmlformats.org/presentationml/2006/main" xmlns:r="http://schemas.openxmlformats.org/officeDocument/2006/relationships">
+  <p:cSld>
+    <p:spTree>
+      <p:nvGrpSpPr>
+        <p:cNvPr id="1" name=""/>
+        <p:cNvGrpSpPr/>
+        <p:nvPr/>
+      </p:nvGrpSpPr>
+      <p:grpSpPr/>
+      <p:sp>
+        <p:nvSpPr>
+          <p:cNvPr id="2" name="Title 1"/>
+          <p:cNvSpPr>
+            <a:spLocks noGrp="1"/>
+          </p:cNvSpPr>
+          <p:nvPr>
+            <p:ph type="title"/>
+          </p:nvPr>
+        </p:nvSpPr>
+        <p:spPr/>
+        <p:txBody>
+          <a:bodyPr/>
+          <a:lstStyle/>
+          <a:p>
+            <a:r>
+              <a:t>Interactive Session 2 (theme)</a:t>
+            </a:r>
+          </a:p>
+        </p:txBody>
+      </p:sp>
+      <p:sp>
+        <p:nvSpPr>
+          <p:cNvPr id="3" name="Text Placeholder 2"/>
+          <p:cNvSpPr>
+            <a:spLocks noGrp="1"/>
+          </p:cNvSpPr>
+          <p:nvPr>
+            <p:ph type="body" idx="1"/>
+          </p:nvPr>
+        </p:nvSpPr>
+        <p:spPr/>
+        <p:txBody>
+          <a:bodyPr/>
+          <a:lstStyle/>
+          <a:p/>
+        </p:txBody>
+      </p:sp>
+    </p:spTree>
+  </p:cSld>
+  <p:clrMapOvr>
+    <a:masterClrMapping/>
+  </p:clrMapOvr>
+</p:sld>
+</file>
+
+<file path=ppt/slides/slide15.xml><?xml version="1.0" encoding="utf-8"?>
+<p:sld xmlns:a="http://schemas.openxmlformats.org/drawingml/2006/main" xmlns:p="http://schemas.openxmlformats.org/presentationml/2006/main" xmlns:r="http://schemas.openxmlformats.org/officeDocument/2006/relationships">
+  <p:cSld>
+    <p:spTree>
+      <p:nvGrpSpPr>
+        <p:cNvPr id="1" name=""/>
+        <p:cNvGrpSpPr/>
+        <p:nvPr/>
+      </p:nvGrpSpPr>
+      <p:grpSpPr/>
+      <p:sp>
+        <p:nvSpPr>
+          <p:cNvPr id="2" name="Title 1"/>
+          <p:cNvSpPr>
+            <a:spLocks noGrp="1"/>
+          </p:cNvSpPr>
+          <p:nvPr>
+            <p:ph type="title"/>
+          </p:nvPr>
+        </p:nvSpPr>
+        <p:spPr/>
+        <p:txBody>
+          <a:bodyPr/>
+          <a:lstStyle/>
+          <a:p>
+            <a:r>
+              <a:t>Interactive Session 3 (theme)</a:t>
+            </a:r>
+          </a:p>
+        </p:txBody>
+      </p:sp>
+      <p:sp>
+        <p:nvSpPr>
+          <p:cNvPr id="3" name="Text Placeholder 2"/>
+          <p:cNvSpPr>
+            <a:spLocks noGrp="1"/>
+          </p:cNvSpPr>
+          <p:nvPr>
+            <p:ph type="body" idx="1"/>
+          </p:nvPr>
+        </p:nvSpPr>
+        <p:spPr/>
+        <p:txBody>
+          <a:bodyPr/>
+          <a:lstStyle/>
+          <a:p/>
+        </p:txBody>
+      </p:sp>
+    </p:spTree>
+  </p:cSld>
+  <p:clrMapOvr>
+    <a:masterClrMapping/>
+  </p:clrMapOvr>
+</p:sld>
+</file>
+
+<file path=ppt/slides/slide16.xml><?xml version="1.0" encoding="utf-8"?>
+<p:sld xmlns:a="http://schemas.openxmlformats.org/drawingml/2006/main" xmlns:p="http://schemas.openxmlformats.org/presentationml/2006/main" xmlns:r="http://schemas.openxmlformats.org/officeDocument/2006/relationships">
+  <p:cSld>
+    <p:spTree>
+      <p:nvGrpSpPr>
+        <p:cNvPr id="1" name=""/>
+        <p:cNvGrpSpPr/>
+        <p:nvPr/>
+      </p:nvGrpSpPr>
+      <p:grpSpPr/>
+      <p:sp>
+        <p:nvSpPr>
+          <p:cNvPr id="2" name="Title 1"/>
+          <p:cNvSpPr>
+            <a:spLocks noGrp="1"/>
+          </p:cNvSpPr>
+          <p:nvPr>
+            <p:ph type="title"/>
+          </p:nvPr>
+        </p:nvSpPr>
+        <p:spPr/>
+        <p:txBody>
+          <a:bodyPr/>
+          <a:lstStyle/>
+          <a:p>
+            <a:r>
+              <a:t>Wrap-up</a:t>
+            </a:r>
+          </a:p>
+        </p:txBody>
+      </p:sp>
+      <p:sp>
+        <p:nvSpPr>
+          <p:cNvPr id="3" name="Text Placeholder 2"/>
+          <p:cNvSpPr>
+            <a:spLocks noGrp="1"/>
+          </p:cNvSpPr>
+          <p:nvPr>
+            <p:ph type="body" idx="1"/>
+          </p:nvPr>
+        </p:nvSpPr>
+        <p:spPr/>
+        <p:txBody>
+          <a:bodyPr/>
+          <a:lstStyle/>
+          <a:p/>
         </p:txBody>
       </p:sp>
     </p:spTree>
@@ -3432,7 +3834,7 @@
           <a:lstStyle/>
           <a:p>
             <a:r>
-              <a:t>Slide Deck Section 1 Title (before colon)</a:t>
+              <a:t>Welcome</a:t>
             </a:r>
           </a:p>
         </p:txBody>
@@ -3451,11 +3853,7 @@
         <p:txBody>
           <a:bodyPr/>
           <a:lstStyle/>
-          <a:p>
-            <a:r>
-              <a:t>Slide Deck Section 1 Sub-Title. You can have quite a lot of text in this field but you can’t use returns at the moment.</a:t>
-            </a:r>
-          </a:p>
+          <a:p/>
         </p:txBody>
       </p:sp>
     </p:spTree>
@@ -3492,7 +3890,7 @@
           <a:lstStyle/>
           <a:p>
             <a:r>
-              <a:t>Section 1 Slide 1 Title</a:t>
+              <a:t>Introduction</a:t>
             </a:r>
           </a:p>
         </p:txBody>
@@ -3515,13 +3913,13 @@
           <a:p>
             <a:pPr/>
             <a:r>
-              <a:t>Section 1 Slide 1 Bullet 1</a:t>
+              <a:t>Introduction 1</a:t>
             </a:r>
           </a:p>
           <a:p>
             <a:pPr/>
             <a:r>
-              <a:t>Section 1 Slide 1 Bullet 2</a:t>
+              <a:t>Introduction 2</a:t>
             </a:r>
           </a:p>
         </p:txBody>
@@ -3560,7 +3958,7 @@
           <a:lstStyle/>
           <a:p>
             <a:r>
-              <a:t>Section 1 Slide 2 Title</a:t>
+              <a:t>Agenda</a:t>
             </a:r>
           </a:p>
         </p:txBody>
@@ -3580,18 +3978,6 @@
           <a:bodyPr/>
           <a:lstStyle/>
           <a:p/>
-          <a:p>
-            <a:pPr/>
-            <a:r>
-              <a:t>Section 1 Slide 2 Bullet 1</a:t>
-            </a:r>
-          </a:p>
-          <a:p>
-            <a:pPr/>
-            <a:r>
-              <a:t>Section 1 Slide 2 Bullet 2</a:t>
-            </a:r>
-          </a:p>
         </p:txBody>
       </p:sp>
     </p:spTree>
@@ -3628,30 +4014,26 @@
           <a:lstStyle/>
           <a:p>
             <a:r>
-              <a:t>Some More General Notes</a:t>
-            </a:r>
-          </a:p>
-        </p:txBody>
-      </p:sp>
-      <p:sp>
-        <p:nvSpPr>
-          <p:cNvPr id="3" name="Text Placeholder 2"/>
-          <p:cNvSpPr>
-            <a:spLocks noGrp="1"/>
-          </p:cNvSpPr>
-          <p:nvPr>
-            <p:ph type="body" idx="1"/>
-          </p:nvPr>
-        </p:nvSpPr>
-        <p:spPr/>
-        <p:txBody>
-          <a:bodyPr/>
-          <a:lstStyle/>
-          <a:p>
-            <a:r>
-              <a:t>On current functionality.</a:t>
-            </a:r>
-          </a:p>
+              <a:t>Objectives</a:t>
+            </a:r>
+          </a:p>
+        </p:txBody>
+      </p:sp>
+      <p:sp>
+        <p:nvSpPr>
+          <p:cNvPr id="3" name="Content Placeholder 2"/>
+          <p:cNvSpPr>
+            <a:spLocks noGrp="1"/>
+          </p:cNvSpPr>
+          <p:nvPr>
+            <p:ph idx="1"/>
+          </p:nvPr>
+        </p:nvSpPr>
+        <p:spPr/>
+        <p:txBody>
+          <a:bodyPr/>
+          <a:lstStyle/>
+          <a:p/>
         </p:txBody>
       </p:sp>
     </p:spTree>
@@ -3688,7 +4070,63 @@
           <a:lstStyle/>
           <a:p>
             <a:r>
-              <a:t>Slide Deck</a:t>
+              <a:t>Framework Refresher</a:t>
+            </a:r>
+          </a:p>
+        </p:txBody>
+      </p:sp>
+      <p:sp>
+        <p:nvSpPr>
+          <p:cNvPr id="3" name="Text Placeholder 2"/>
+          <p:cNvSpPr>
+            <a:spLocks noGrp="1"/>
+          </p:cNvSpPr>
+          <p:nvPr>
+            <p:ph type="body" idx="1"/>
+          </p:nvPr>
+        </p:nvSpPr>
+        <p:spPr/>
+        <p:txBody>
+          <a:bodyPr/>
+          <a:lstStyle/>
+          <a:p/>
+        </p:txBody>
+      </p:sp>
+    </p:spTree>
+  </p:cSld>
+  <p:clrMapOvr>
+    <a:masterClrMapping/>
+  </p:clrMapOvr>
+</p:sld>
+</file>
+
+<file path=ppt/slides/slide7.xml><?xml version="1.0" encoding="utf-8"?>
+<p:sld xmlns:a="http://schemas.openxmlformats.org/drawingml/2006/main" xmlns:p="http://schemas.openxmlformats.org/presentationml/2006/main" xmlns:r="http://schemas.openxmlformats.org/officeDocument/2006/relationships">
+  <p:cSld>
+    <p:spTree>
+      <p:nvGrpSpPr>
+        <p:cNvPr id="1" name=""/>
+        <p:cNvGrpSpPr/>
+        <p:nvPr/>
+      </p:nvGrpSpPr>
+      <p:grpSpPr/>
+      <p:sp>
+        <p:nvSpPr>
+          <p:cNvPr id="2" name="Title 1"/>
+          <p:cNvSpPr>
+            <a:spLocks noGrp="1"/>
+          </p:cNvSpPr>
+          <p:nvPr>
+            <p:ph type="title"/>
+          </p:nvPr>
+        </p:nvSpPr>
+        <p:spPr/>
+        <p:txBody>
+          <a:bodyPr/>
+          <a:lstStyle/>
+          <a:p>
+            <a:r>
+              <a:t>Reminder of Purpose</a:t>
             </a:r>
           </a:p>
         </p:txBody>
@@ -3711,9 +4149,121 @@
           <a:p>
             <a:pPr/>
             <a:r>
-              <a:t>I think I’ve got this working pretty well now.  You can use my “Tags” idea to include a Title and Sub-title for the Slide Deck or any section.</a:t>
-            </a:r>
-          </a:p>
+              <a:t>lkjlkjlj</a:t>
+            </a:r>
+          </a:p>
+        </p:txBody>
+      </p:sp>
+    </p:spTree>
+  </p:cSld>
+  <p:clrMapOvr>
+    <a:masterClrMapping/>
+  </p:clrMapOvr>
+</p:sld>
+</file>
+
+<file path=ppt/slides/slide8.xml><?xml version="1.0" encoding="utf-8"?>
+<p:sld xmlns:a="http://schemas.openxmlformats.org/drawingml/2006/main" xmlns:p="http://schemas.openxmlformats.org/presentationml/2006/main" xmlns:r="http://schemas.openxmlformats.org/officeDocument/2006/relationships">
+  <p:cSld>
+    <p:spTree>
+      <p:nvGrpSpPr>
+        <p:cNvPr id="1" name=""/>
+        <p:cNvGrpSpPr/>
+        <p:nvPr/>
+      </p:nvGrpSpPr>
+      <p:grpSpPr/>
+      <p:sp>
+        <p:nvSpPr>
+          <p:cNvPr id="2" name="Title 1"/>
+          <p:cNvSpPr>
+            <a:spLocks noGrp="1"/>
+          </p:cNvSpPr>
+          <p:nvPr>
+            <p:ph type="title"/>
+          </p:nvPr>
+        </p:nvSpPr>
+        <p:spPr/>
+        <p:txBody>
+          <a:bodyPr/>
+          <a:lstStyle/>
+          <a:p>
+            <a:r>
+              <a:t>What it is</a:t>
+            </a:r>
+          </a:p>
+        </p:txBody>
+      </p:sp>
+      <p:sp>
+        <p:nvSpPr>
+          <p:cNvPr id="3" name="Content Placeholder 2"/>
+          <p:cNvSpPr>
+            <a:spLocks noGrp="1"/>
+          </p:cNvSpPr>
+          <p:nvPr>
+            <p:ph idx="1"/>
+          </p:nvPr>
+        </p:nvSpPr>
+        <p:spPr/>
+        <p:txBody>
+          <a:bodyPr/>
+          <a:lstStyle/>
+          <a:p/>
+        </p:txBody>
+      </p:sp>
+    </p:spTree>
+  </p:cSld>
+  <p:clrMapOvr>
+    <a:masterClrMapping/>
+  </p:clrMapOvr>
+</p:sld>
+</file>
+
+<file path=ppt/slides/slide9.xml><?xml version="1.0" encoding="utf-8"?>
+<p:sld xmlns:a="http://schemas.openxmlformats.org/drawingml/2006/main" xmlns:p="http://schemas.openxmlformats.org/presentationml/2006/main" xmlns:r="http://schemas.openxmlformats.org/officeDocument/2006/relationships">
+  <p:cSld>
+    <p:spTree>
+      <p:nvGrpSpPr>
+        <p:cNvPr id="1" name=""/>
+        <p:cNvGrpSpPr/>
+        <p:nvPr/>
+      </p:nvGrpSpPr>
+      <p:grpSpPr/>
+      <p:sp>
+        <p:nvSpPr>
+          <p:cNvPr id="2" name="Title 1"/>
+          <p:cNvSpPr>
+            <a:spLocks noGrp="1"/>
+          </p:cNvSpPr>
+          <p:nvPr>
+            <p:ph type="title"/>
+          </p:nvPr>
+        </p:nvSpPr>
+        <p:spPr/>
+        <p:txBody>
+          <a:bodyPr/>
+          <a:lstStyle/>
+          <a:p>
+            <a:r>
+              <a:t>What it isn’t</a:t>
+            </a:r>
+          </a:p>
+        </p:txBody>
+      </p:sp>
+      <p:sp>
+        <p:nvSpPr>
+          <p:cNvPr id="3" name="Content Placeholder 2"/>
+          <p:cNvSpPr>
+            <a:spLocks noGrp="1"/>
+          </p:cNvSpPr>
+          <p:nvPr>
+            <p:ph idx="1"/>
+          </p:nvPr>
+        </p:nvSpPr>
+        <p:spPr/>
+        <p:txBody>
+          <a:bodyPr/>
+          <a:lstStyle/>
+          <a:p/>
         </p:txBody>
       </p:sp>
     </p:spTree>

</xml_diff>